<commit_message>
Algorithm readability improved slightly on slide 16
</commit_message>
<xml_diff>
--- a/Slides-RPR/2019-H1-DAA-L27-Greedy-Algo-Huffman-Codes.pptx
+++ b/Slides-RPR/2019-H1-DAA-L27-Greedy-Algo-Huffman-Codes.pptx
@@ -26,7 +26,6 @@
     <p:sldId id="271" r:id="rId23"/>
     <p:sldId id="272" r:id="rId24"/>
     <p:sldId id="273" r:id="rId25"/>
-    <p:sldId id="274" r:id="rId26"/>
   </p:sldIdLst>
   <p:sldSz cx="10160000" cy="7620000"/>
   <p:notesSz cx="6858000" cy="9144000"/>
@@ -4889,24 +4888,24 @@
       </p:par>
     </p:tnLst>
     <p:bldLst>
+      <p:bldP build="whole" bldLvl="1" animBg="1" rev="0" advAuto="0" spid="148" grpId="15"/>
+      <p:bldP build="whole" bldLvl="1" animBg="1" rev="0" advAuto="0" spid="145" grpId="9"/>
+      <p:bldP build="whole" bldLvl="1" animBg="1" rev="0" advAuto="0" spid="127" grpId="2"/>
+      <p:bldP build="p" bldLvl="5" animBg="1" rev="0" advAuto="0" spid="121" grpId="1"/>
+      <p:bldP build="whole" bldLvl="1" animBg="1" rev="0" advAuto="0" spid="156" grpId="12"/>
+      <p:bldP build="whole" bldLvl="1" animBg="1" rev="0" advAuto="0" spid="148" grpId="17"/>
+      <p:bldP build="whole" bldLvl="1" animBg="1" rev="0" advAuto="0" spid="133" grpId="4"/>
+      <p:bldP build="whole" bldLvl="1" animBg="1" rev="0" advAuto="0" spid="151" grpId="16"/>
+      <p:bldP build="whole" bldLvl="1" animBg="1" rev="0" advAuto="0" spid="155" grpId="11"/>
+      <p:bldP build="whole" bldLvl="1" animBg="1" rev="0" advAuto="0" spid="139" grpId="6"/>
+      <p:bldP build="whole" bldLvl="1" animBg="1" rev="0" advAuto="0" spid="151" grpId="18"/>
+      <p:bldP build="whole" bldLvl="1" animBg="1" rev="0" advAuto="0" spid="139" grpId="8"/>
+      <p:bldP build="whole" bldLvl="1" animBg="1" rev="0" advAuto="0" spid="130" grpId="3"/>
+      <p:bldP build="whole" bldLvl="1" animBg="1" rev="0" advAuto="0" spid="154" grpId="10"/>
       <p:bldP build="whole" bldLvl="1" animBg="1" rev="0" advAuto="0" spid="157" grpId="13"/>
-      <p:bldP build="whole" bldLvl="1" animBg="1" rev="0" advAuto="0" spid="130" grpId="3"/>
-      <p:bldP build="whole" bldLvl="1" animBg="1" rev="0" advAuto="0" spid="148" grpId="15"/>
-      <p:bldP build="whole" bldLvl="1" animBg="1" rev="0" advAuto="0" spid="139" grpId="6"/>
       <p:bldP build="whole" bldLvl="1" animBg="1" rev="0" advAuto="0" spid="130" grpId="7"/>
-      <p:bldP build="whole" bldLvl="1" animBg="1" rev="0" advAuto="0" spid="139" grpId="8"/>
-      <p:bldP build="whole" bldLvl="1" animBg="1" rev="0" advAuto="0" spid="156" grpId="12"/>
-      <p:bldP build="whole" bldLvl="1" animBg="1" rev="0" advAuto="0" spid="155" grpId="11"/>
+      <p:bldP build="whole" bldLvl="1" animBg="1" rev="0" advAuto="0" spid="136" grpId="5"/>
       <p:bldP build="whole" bldLvl="1" animBg="1" rev="0" advAuto="0" spid="142" grpId="14"/>
-      <p:bldP build="whole" bldLvl="1" animBg="1" rev="0" advAuto="0" spid="151" grpId="16"/>
-      <p:bldP build="whole" bldLvl="1" animBg="1" rev="0" advAuto="0" spid="148" grpId="17"/>
-      <p:bldP build="whole" bldLvl="1" animBg="1" rev="0" advAuto="0" spid="151" grpId="18"/>
-      <p:bldP build="p" bldLvl="5" animBg="1" rev="0" advAuto="0" spid="121" grpId="1"/>
-      <p:bldP build="whole" bldLvl="1" animBg="1" rev="0" advAuto="0" spid="127" grpId="2"/>
-      <p:bldP build="whole" bldLvl="1" animBg="1" rev="0" advAuto="0" spid="154" grpId="10"/>
-      <p:bldP build="whole" bldLvl="1" animBg="1" rev="0" advAuto="0" spid="136" grpId="5"/>
-      <p:bldP build="whole" bldLvl="1" animBg="1" rev="0" advAuto="0" spid="145" grpId="9"/>
-      <p:bldP build="whole" bldLvl="1" animBg="1" rev="0" advAuto="0" spid="133" grpId="4"/>
     </p:bldLst>
   </p:timing>
 </p:sld>
@@ -6279,8 +6278,8 @@
           </p:nvSpPr>
           <p:spPr>
             <a:xfrm flipH="1" flipV="1">
-              <a:off x="1307891" y="513184"/>
-              <a:ext cx="566934" cy="566934"/>
+              <a:off x="1307892" y="513184"/>
+              <a:ext cx="566933" cy="566934"/>
             </a:xfrm>
             <a:prstGeom prst="line">
               <a:avLst/>
@@ -7589,20 +7588,20 @@
       </p:par>
     </p:tnLst>
     <p:bldLst>
-      <p:bldP build="whole" bldLvl="1" animBg="1" rev="0" advAuto="0" spid="206" grpId="9"/>
+      <p:bldP build="whole" bldLvl="1" animBg="1" rev="0" advAuto="0" spid="209" grpId="13"/>
       <p:bldP build="whole" bldLvl="1" animBg="1" rev="0" advAuto="0" spid="181" grpId="7"/>
       <p:bldP build="whole" bldLvl="1" animBg="1" rev="0" advAuto="0" spid="196" grpId="10"/>
+      <p:bldP build="whole" bldLvl="1" animBg="1" rev="0" advAuto="0" spid="171" grpId="2"/>
+      <p:bldP build="whole" bldLvl="1" animBg="1" rev="0" advAuto="0" spid="165" grpId="6"/>
+      <p:bldP build="whole" bldLvl="1" animBg="1" rev="0" advAuto="0" spid="183" grpId="4"/>
+      <p:bldP build="whole" bldLvl="1" animBg="1" rev="0" advAuto="0" spid="165" grpId="8"/>
       <p:bldP build="whole" bldLvl="1" animBg="1" rev="0" advAuto="0" spid="168" grpId="1"/>
-      <p:bldP build="whole" bldLvl="1" animBg="1" rev="0" advAuto="0" spid="209" grpId="13"/>
-      <p:bldP build="whole" bldLvl="1" animBg="1" rev="0" advAuto="0" spid="165" grpId="6"/>
-      <p:bldP build="whole" bldLvl="1" animBg="1" rev="0" advAuto="0" spid="165" grpId="8"/>
+      <p:bldP build="whole" bldLvl="1" animBg="1" rev="0" advAuto="0" spid="182" grpId="3"/>
+      <p:bldP build="whole" bldLvl="1" animBg="1" rev="0" advAuto="0" spid="208" grpId="12"/>
+      <p:bldP build="whole" bldLvl="1" animBg="1" rev="0" advAuto="0" spid="193" grpId="14"/>
+      <p:bldP build="whole" bldLvl="1" animBg="1" rev="0" advAuto="0" spid="206" grpId="9"/>
+      <p:bldP build="whole" bldLvl="1" animBg="1" rev="0" advAuto="0" spid="207" grpId="11"/>
       <p:bldP build="whole" bldLvl="1" animBg="1" rev="0" advAuto="0" spid="184" grpId="5"/>
-      <p:bldP build="whole" bldLvl="1" animBg="1" rev="0" advAuto="0" spid="182" grpId="3"/>
-      <p:bldP build="whole" bldLvl="1" animBg="1" rev="0" advAuto="0" spid="183" grpId="4"/>
-      <p:bldP build="whole" bldLvl="1" animBg="1" rev="0" advAuto="0" spid="171" grpId="2"/>
-      <p:bldP build="whole" bldLvl="1" animBg="1" rev="0" advAuto="0" spid="208" grpId="12"/>
-      <p:bldP build="whole" bldLvl="1" animBg="1" rev="0" advAuto="0" spid="207" grpId="11"/>
-      <p:bldP build="whole" bldLvl="1" animBg="1" rev="0" advAuto="0" spid="193" grpId="14"/>
     </p:bldLst>
   </p:timing>
 </p:sld>
@@ -10856,19 +10855,19 @@
       </p:par>
     </p:tnLst>
     <p:bldLst>
+      <p:bldP build="whole" bldLvl="1" animBg="1" rev="0" advAuto="0" spid="268" grpId="6"/>
+      <p:bldP build="whole" bldLvl="1" animBg="1" rev="0" advAuto="0" spid="271" grpId="12"/>
+      <p:bldP build="whole" bldLvl="1" animBg="1" rev="0" advAuto="0" spid="273" grpId="9"/>
+      <p:bldP build="whole" bldLvl="1" animBg="1" rev="0" advAuto="0" spid="272" grpId="8"/>
+      <p:bldP build="whole" bldLvl="1" animBg="1" rev="0" advAuto="0" spid="265" grpId="3"/>
+      <p:bldP build="whole" bldLvl="1" animBg="1" rev="0" advAuto="0" spid="255" grpId="2"/>
+      <p:bldP build="whole" bldLvl="1" animBg="1" rev="0" advAuto="0" spid="275" grpId="13"/>
+      <p:bldP build="whole" bldLvl="1" animBg="1" rev="0" advAuto="0" spid="269" grpId="7"/>
+      <p:bldP build="whole" bldLvl="1" animBg="1" rev="0" advAuto="0" spid="266" grpId="4"/>
+      <p:bldP build="whole" bldLvl="1" animBg="1" rev="0" advAuto="0" spid="264" grpId="1"/>
+      <p:bldP build="whole" bldLvl="1" animBg="1" rev="0" advAuto="0" spid="270" grpId="10"/>
+      <p:bldP build="whole" bldLvl="1" animBg="1" rev="0" advAuto="0" spid="267" grpId="5"/>
       <p:bldP build="whole" bldLvl="1" animBg="1" rev="0" advAuto="0" spid="274" grpId="11"/>
-      <p:bldP build="whole" bldLvl="1" animBg="1" rev="0" advAuto="0" spid="268" grpId="6"/>
-      <p:bldP build="whole" bldLvl="1" animBg="1" rev="0" advAuto="0" spid="272" grpId="8"/>
-      <p:bldP build="whole" bldLvl="1" animBg="1" rev="0" advAuto="0" spid="264" grpId="1"/>
-      <p:bldP build="whole" bldLvl="1" animBg="1" rev="0" advAuto="0" spid="271" grpId="12"/>
-      <p:bldP build="whole" bldLvl="1" animBg="1" rev="0" advAuto="0" spid="265" grpId="3"/>
-      <p:bldP build="whole" bldLvl="1" animBg="1" rev="0" advAuto="0" spid="266" grpId="4"/>
-      <p:bldP build="whole" bldLvl="1" animBg="1" rev="0" advAuto="0" spid="255" grpId="2"/>
-      <p:bldP build="whole" bldLvl="1" animBg="1" rev="0" advAuto="0" spid="270" grpId="10"/>
-      <p:bldP build="whole" bldLvl="1" animBg="1" rev="0" advAuto="0" spid="269" grpId="7"/>
-      <p:bldP build="whole" bldLvl="1" animBg="1" rev="0" advAuto="0" spid="273" grpId="9"/>
-      <p:bldP build="whole" bldLvl="1" animBg="1" rev="0" advAuto="0" spid="275" grpId="13"/>
-      <p:bldP build="whole" bldLvl="1" animBg="1" rev="0" advAuto="0" spid="267" grpId="5"/>
     </p:bldLst>
   </p:timing>
 </p:sld>
@@ -14361,9 +14360,9 @@
       </p:par>
     </p:tnLst>
     <p:bldLst>
+      <p:bldP build="p" bldLvl="5" animBg="1" rev="0" advAuto="0" spid="324" grpId="3"/>
       <p:bldP build="p" bldLvl="5" animBg="1" rev="0" advAuto="0" spid="319" grpId="1"/>
       <p:bldP build="p" bldLvl="5" animBg="1" rev="0" advAuto="0" spid="323" grpId="2"/>
-      <p:bldP build="p" bldLvl="5" animBg="1" rev="0" advAuto="0" spid="324" grpId="3"/>
     </p:bldLst>
   </p:timing>
 </p:sld>
@@ -14450,7 +14449,7 @@
               <a:t>What happens if </a:t>
             </a:r>
             <a:r>
-              <a:rPr>
+              <a:rPr b="1" sz="3000">
                 <a:latin typeface="Courier New"/>
                 <a:ea typeface="Courier New"/>
                 <a:cs typeface="Courier New"/>
@@ -14465,7 +14464,7 @@
           <a:p>
             <a:pPr lvl="1"/>
             <a:r>
-              <a:t>Codeword length of a more frequent character is always smaller than codeword length less frequent characters. Proof by contradiction.</a:t>
+              <a:t>Codeword length of a more frequent character is always smaller than codeword length of less frequent characters. Proof by contradiction.</a:t>
             </a:r>
           </a:p>
           <a:p>
@@ -15158,10 +15157,14 @@
               <a:buNone/>
             </a:pPr>
             <a:r>
-              <a:t>// i/p: an array </a:t>
-            </a:r>
-            <a:r>
-              <a:rPr>
+              <a:t>// </a:t>
+            </a:r>
+            <a:r>
+              <a:rPr sz="2800"/>
+              <a:t>i/p: an array </a:t>
+            </a:r>
+            <a:r>
+              <a:rPr sz="2800">
                 <a:latin typeface="Courier New"/>
                 <a:ea typeface="Courier New"/>
                 <a:cs typeface="Courier New"/>
@@ -15170,6 +15173,7 @@
               <a:t>W[0:n-1]</a:t>
             </a:r>
             <a:r>
+              <a:rPr sz="2800"/>
               <a:t> of weights</a:t>
             </a:r>
           </a:p>
@@ -15182,7 +15186,11 @@
               <a:buNone/>
             </a:pPr>
             <a:r>
-              <a:t>// o/p: A Huffman tree with leaves having weights of W</a:t>
+              <a:t>// </a:t>
+            </a:r>
+            <a:r>
+              <a:rPr sz="2800"/>
+              <a:t>o/p: A Huffman tree with leaves having weights of W</a:t>
             </a:r>
           </a:p>
           <a:p>
@@ -16635,7 +16643,19 @@
           <a:p>
             <a:pPr lvl="1"/>
             <a:r>
-              <a:t>Effectively reducing number of trees by 1.</a:t>
+              <a:t>Effectively reducing number of trees by </a:t>
+            </a:r>
+            <a:r>
+              <a:rPr>
+                <a:latin typeface="Courier New"/>
+                <a:ea typeface="Courier New"/>
+                <a:cs typeface="Courier New"/>
+                <a:sym typeface="Courier New"/>
+              </a:rPr>
+              <a:t>1</a:t>
+            </a:r>
+            <a:r>
+              <a:t>.</a:t>
             </a:r>
           </a:p>
           <a:p>
@@ -17230,7 +17250,7 @@
       </p:grpSpPr>
       <p:sp>
         <p:nvSpPr>
-          <p:cNvPr id="344" name="Complexity Analysis (Improved)"/>
+          <p:cNvPr id="344" name="Summary"/>
           <p:cNvSpPr txBox="1"/>
           <p:nvPr>
             <p:ph type="title"/>
@@ -17247,14 +17267,14 @@
           <a:p>
             <a:pPr/>
             <a:r>
-              <a:t>Complexity Analysis (Improved)</a:t>
+              <a:t>Summary</a:t>
             </a:r>
           </a:p>
         </p:txBody>
       </p:sp>
       <p:sp>
         <p:nvSpPr>
-          <p:cNvPr id="345" name="Maintain priority Q as sorted array in ascending order of weights.  (Assume it is given),…"/>
+          <p:cNvPr id="345" name="Huffman codes…"/>
           <p:cNvSpPr txBox="1"/>
           <p:nvPr>
             <p:ph type="body" idx="1"/>
@@ -17269,353 +17289,27 @@
           <a:bodyPr/>
           <a:lstStyle/>
           <a:p>
-            <a:pPr marL="493888" indent="-493888">
-              <a:spcBef>
-                <a:spcPts val="100"/>
-              </a:spcBef>
-              <a:buAutoNum type="arabicPeriod" startAt="1"/>
-              <a:defRPr sz="2800"/>
-            </a:pPr>
-            <a:r>
-              <a:t>Maintain priority Q as sorted array in ascending order of weights.  (Assume it is given), </a:t>
-            </a:r>
-          </a:p>
-          <a:p>
-            <a:pPr lvl="1" marL="1128888" indent="-493888">
-              <a:spcBef>
-                <a:spcPts val="100"/>
-              </a:spcBef>
-              <a:buAutoNum type="alphaLcPeriod" startAt="1"/>
-              <a:defRPr sz="2800"/>
-            </a:pPr>
-            <a:r>
-              <a:t>otherwise it takes </a:t>
-            </a:r>
-            <a:r>
-              <a:rPr>
-                <a:latin typeface="Courier New"/>
-                <a:ea typeface="Courier New"/>
-                <a:cs typeface="Courier New"/>
-                <a:sym typeface="Courier New"/>
-              </a:rPr>
-              <a:t>O(n.lg n)</a:t>
-            </a:r>
-            <a:r>
-              <a:t>time.</a:t>
-            </a:r>
-          </a:p>
-          <a:p>
-            <a:pPr marL="493888" indent="-493888">
-              <a:spcBef>
-                <a:spcPts val="100"/>
-              </a:spcBef>
-              <a:buAutoNum type="arabicPeriod" startAt="1"/>
-              <a:defRPr sz="2800"/>
-            </a:pPr>
-            <a:r>
-              <a:t>Maintain another array </a:t>
-            </a:r>
-            <a:r>
-              <a:rPr>
-                <a:latin typeface="Courier New"/>
-                <a:ea typeface="Courier New"/>
-                <a:cs typeface="Courier New"/>
-                <a:sym typeface="Courier New"/>
-              </a:rPr>
-              <a:t>Q’</a:t>
-            </a:r>
-            <a:r>
-              <a:t> of size </a:t>
-            </a:r>
-            <a:r>
-              <a:rPr>
-                <a:latin typeface="Courier New"/>
-                <a:ea typeface="Courier New"/>
-                <a:cs typeface="Courier New"/>
-                <a:sym typeface="Courier New"/>
-              </a:rPr>
-              <a:t>1</a:t>
-            </a:r>
-            <a:r>
-              <a:t> (initially empty)</a:t>
-            </a:r>
-          </a:p>
-          <a:p>
-            <a:pPr marL="493888" indent="-493888">
-              <a:spcBef>
-                <a:spcPts val="100"/>
-              </a:spcBef>
-              <a:buAutoNum type="arabicPeriod" startAt="1"/>
-              <a:defRPr sz="2800"/>
-            </a:pPr>
-            <a:r>
-              <a:t>Remove the first </a:t>
-            </a:r>
-            <a:r>
-              <a:rPr>
-                <a:latin typeface="Arial"/>
-                <a:ea typeface="Arial"/>
-                <a:cs typeface="Arial"/>
-                <a:sym typeface="Arial"/>
-              </a:rPr>
-              <a:t>2</a:t>
-            </a:r>
-            <a:r>
-              <a:t> elements from </a:t>
-            </a:r>
-            <a:r>
-              <a:rPr>
-                <a:latin typeface="Courier New"/>
-                <a:ea typeface="Courier New"/>
-                <a:cs typeface="Courier New"/>
-                <a:sym typeface="Courier New"/>
-              </a:rPr>
-              <a:t>Q</a:t>
-            </a:r>
-            <a:r>
-              <a:t>.</a:t>
-            </a:r>
-          </a:p>
-          <a:p>
-            <a:pPr marL="493888" indent="-493888">
-              <a:spcBef>
-                <a:spcPts val="100"/>
-              </a:spcBef>
-              <a:buAutoNum type="arabicPeriod" startAt="1"/>
-              <a:defRPr sz="2800"/>
-            </a:pPr>
-            <a:r>
-              <a:t>Merge these 2 into new element </a:t>
-            </a:r>
-            <a:r>
-              <a:rPr>
-                <a:latin typeface="Courier New"/>
-                <a:ea typeface="Courier New"/>
-                <a:cs typeface="Courier New"/>
-                <a:sym typeface="Courier New"/>
-              </a:rPr>
-              <a:t>N</a:t>
-            </a:r>
-            <a:r>
-              <a:t> and add N to </a:t>
-            </a:r>
-            <a:r>
-              <a:rPr>
-                <a:latin typeface="Courier New"/>
-                <a:ea typeface="Courier New"/>
-                <a:cs typeface="Courier New"/>
-                <a:sym typeface="Courier New"/>
-              </a:rPr>
-              <a:t>Q’</a:t>
-            </a:r>
-          </a:p>
-          <a:p>
-            <a:pPr marL="493888" indent="-493888">
-              <a:spcBef>
-                <a:spcPts val="100"/>
-              </a:spcBef>
-              <a:buAutoNum type="arabicPeriod" startAt="1"/>
-              <a:defRPr sz="2800"/>
-            </a:pPr>
-            <a:r>
-              <a:t>Now consider 2 elements from </a:t>
-            </a:r>
-            <a:r>
-              <a:rPr>
-                <a:latin typeface="Courier New"/>
-                <a:ea typeface="Courier New"/>
-                <a:cs typeface="Courier New"/>
-                <a:sym typeface="Courier New"/>
-              </a:rPr>
-              <a:t>Q</a:t>
-            </a:r>
-            <a:r>
-              <a:t> and </a:t>
-            </a:r>
-            <a:r>
-              <a:rPr>
-                <a:latin typeface="Courier New"/>
-                <a:ea typeface="Courier New"/>
-                <a:cs typeface="Courier New"/>
-                <a:sym typeface="Courier New"/>
-              </a:rPr>
-              <a:t>1</a:t>
-            </a:r>
-            <a:r>
-              <a:t> from </a:t>
-            </a:r>
-            <a:r>
-              <a:rPr>
-                <a:latin typeface="Courier New"/>
-                <a:ea typeface="Courier New"/>
-                <a:cs typeface="Courier New"/>
-                <a:sym typeface="Courier New"/>
-              </a:rPr>
-              <a:t>Q’</a:t>
-            </a:r>
-          </a:p>
-          <a:p>
-            <a:pPr marL="493888" indent="-493888">
-              <a:spcBef>
-                <a:spcPts val="100"/>
-              </a:spcBef>
-              <a:buAutoNum type="arabicPeriod" startAt="1"/>
-              <a:defRPr sz="2800"/>
-            </a:pPr>
-            <a:r>
-              <a:t>Remove the two with minimum weights and merge these to create new element </a:t>
-            </a:r>
-            <a:r>
-              <a:rPr>
-                <a:latin typeface="Courier New"/>
-                <a:ea typeface="Courier New"/>
-                <a:cs typeface="Courier New"/>
-                <a:sym typeface="Courier New"/>
-              </a:rPr>
-              <a:t>N</a:t>
-            </a:r>
-            <a:r>
-              <a:t>.</a:t>
-            </a:r>
-          </a:p>
-          <a:p>
-            <a:pPr marL="493888" indent="-493888">
-              <a:spcBef>
-                <a:spcPts val="100"/>
-              </a:spcBef>
-              <a:buAutoNum type="arabicPeriod" startAt="1"/>
-              <a:defRPr sz="2800"/>
-            </a:pPr>
-            <a:r>
-              <a:t>If one of two elements picked from </a:t>
-            </a:r>
-            <a:r>
-              <a:rPr>
-                <a:latin typeface="Courier New"/>
-                <a:ea typeface="Courier New"/>
-                <a:cs typeface="Courier New"/>
-                <a:sym typeface="Courier New"/>
-              </a:rPr>
-              <a:t>Q’</a:t>
-            </a:r>
-            <a:r>
-              <a:t>, add </a:t>
-            </a:r>
-            <a:r>
-              <a:rPr>
-                <a:latin typeface="Courier New"/>
-                <a:ea typeface="Courier New"/>
-                <a:cs typeface="Courier New"/>
-                <a:sym typeface="Courier New"/>
-              </a:rPr>
-              <a:t>N</a:t>
-            </a:r>
-            <a:r>
-              <a:t> to </a:t>
-            </a:r>
-            <a:r>
-              <a:rPr>
-                <a:latin typeface="Courier New"/>
-                <a:ea typeface="Courier New"/>
-                <a:cs typeface="Courier New"/>
-                <a:sym typeface="Courier New"/>
-              </a:rPr>
-              <a:t>Q’</a:t>
-            </a:r>
-          </a:p>
-          <a:p>
-            <a:pPr lvl="3" marL="0" indent="685800">
-              <a:spcBef>
-                <a:spcPts val="100"/>
-              </a:spcBef>
-              <a:buSzTx/>
-              <a:buNone/>
-            </a:pPr>
-            <a:r>
-              <a:t>else add </a:t>
-            </a:r>
-            <a:r>
-              <a:rPr>
-                <a:latin typeface="Courier New"/>
-                <a:ea typeface="Courier New"/>
-                <a:cs typeface="Courier New"/>
-                <a:sym typeface="Courier New"/>
-              </a:rPr>
-              <a:t>N</a:t>
-            </a:r>
-            <a:r>
-              <a:t> to </a:t>
-            </a:r>
-            <a:r>
-              <a:rPr>
-                <a:latin typeface="Courier New"/>
-                <a:ea typeface="Courier New"/>
-                <a:cs typeface="Courier New"/>
-                <a:sym typeface="Courier New"/>
-              </a:rPr>
-              <a:t>Q</a:t>
-            </a:r>
-            <a:r>
-              <a:t>.</a:t>
-            </a:r>
-          </a:p>
-          <a:p>
-            <a:pPr marL="493888" indent="-493888">
-              <a:spcBef>
-                <a:spcPts val="100"/>
-              </a:spcBef>
-              <a:buAutoNum type="arabicPeriod" startAt="1"/>
-              <a:defRPr sz="2800"/>
-            </a:pPr>
-            <a:r>
-              <a:t>Repeat the steps 5, 6, 7 till only </a:t>
-            </a:r>
-            <a:r>
-              <a:rPr>
-                <a:latin typeface="Courier New"/>
-                <a:ea typeface="Courier New"/>
-                <a:cs typeface="Courier New"/>
-                <a:sym typeface="Courier New"/>
-              </a:rPr>
-              <a:t>1</a:t>
-            </a:r>
-            <a:r>
-              <a:t> tree is left.</a:t>
-            </a:r>
-          </a:p>
-          <a:p>
-            <a:pPr marL="0" indent="0">
-              <a:spcBef>
-                <a:spcPts val="100"/>
-              </a:spcBef>
-              <a:buSzTx/>
-              <a:buNone/>
-              <a:defRPr sz="2800"/>
-            </a:pPr>
-          </a:p>
-          <a:p>
-            <a:pPr marL="0" indent="0">
-              <a:spcBef>
-                <a:spcPts val="100"/>
-              </a:spcBef>
-              <a:buSzTx/>
-              <a:buNone/>
-              <a:defRPr sz="3000"/>
-            </a:pPr>
-            <a:r>
-              <a:t>Time Complexity: </a:t>
-            </a:r>
-            <a:r>
-              <a:rPr>
-                <a:latin typeface="Courier New"/>
-                <a:ea typeface="Courier New"/>
-                <a:cs typeface="Courier New"/>
-                <a:sym typeface="Courier New"/>
-              </a:rPr>
-              <a:t>O(N)</a:t>
-            </a:r>
-            <a:r>
-              <a:t> excluding the sorting of weights</a:t>
+            <a:pPr/>
+            <a:r>
+              <a:t>Huffman codes</a:t>
+            </a:r>
+          </a:p>
+          <a:p>
+            <a:pPr/>
+            <a:r>
+              <a:t>Huffman tree</a:t>
+            </a:r>
+          </a:p>
+          <a:p>
+            <a:pPr/>
+            <a:r>
+              <a:t>Algo</a:t>
+            </a:r>
+          </a:p>
+          <a:p>
+            <a:pPr/>
+            <a:r>
+              <a:t>Complexity analysis</a:t>
             </a:r>
           </a:p>
         </p:txBody>
@@ -17961,390 +17655,6 @@
                       </p:childTnLst>
                     </p:cTn>
                   </p:par>
-                  <p:par>
-                    <p:cTn id="21" fill="hold">
-                      <p:stCondLst>
-                        <p:cond delay="indefinite"/>
-                      </p:stCondLst>
-                      <p:childTnLst>
-                        <p:par>
-                          <p:cTn id="22" fill="hold">
-                            <p:stCondLst>
-                              <p:cond delay="0"/>
-                            </p:stCondLst>
-                            <p:childTnLst>
-                              <p:par>
-                                <p:cTn id="23" presetClass="entr" nodeType="clickEffect" presetSubtype="0" presetID="1" grpId="1" fill="hold">
-                                  <p:stCondLst>
-                                    <p:cond delay="0"/>
-                                  </p:stCondLst>
-                                  <p:iterate type="el" backwards="0">
-                                    <p:tmAbs val="0"/>
-                                  </p:iterate>
-                                  <p:childTnLst>
-                                    <p:set>
-                                      <p:cBhvr>
-                                        <p:cTn id="24" fill="hold"/>
-                                        <p:tgtEl>
-                                          <p:spTgt spid="345">
-                                            <p:txEl>
-                                              <p:pRg st="4" end="4"/>
-                                            </p:txEl>
-                                          </p:spTgt>
-                                        </p:tgtEl>
-                                        <p:attrNameLst>
-                                          <p:attrName>style.visibility</p:attrName>
-                                        </p:attrNameLst>
-                                      </p:cBhvr>
-                                      <p:to>
-                                        <p:strVal val="visible"/>
-                                      </p:to>
-                                    </p:set>
-                                  </p:childTnLst>
-                                </p:cTn>
-                              </p:par>
-                            </p:childTnLst>
-                          </p:cTn>
-                        </p:par>
-                      </p:childTnLst>
-                    </p:cTn>
-                  </p:par>
-                  <p:par>
-                    <p:cTn id="25" fill="hold">
-                      <p:stCondLst>
-                        <p:cond delay="indefinite"/>
-                      </p:stCondLst>
-                      <p:childTnLst>
-                        <p:par>
-                          <p:cTn id="26" fill="hold">
-                            <p:stCondLst>
-                              <p:cond delay="0"/>
-                            </p:stCondLst>
-                            <p:childTnLst>
-                              <p:par>
-                                <p:cTn id="27" presetClass="entr" nodeType="clickEffect" presetSubtype="0" presetID="1" grpId="1" fill="hold">
-                                  <p:stCondLst>
-                                    <p:cond delay="0"/>
-                                  </p:stCondLst>
-                                  <p:iterate type="el" backwards="0">
-                                    <p:tmAbs val="0"/>
-                                  </p:iterate>
-                                  <p:childTnLst>
-                                    <p:set>
-                                      <p:cBhvr>
-                                        <p:cTn id="28" fill="hold"/>
-                                        <p:tgtEl>
-                                          <p:spTgt spid="345">
-                                            <p:txEl>
-                                              <p:pRg st="5" end="5"/>
-                                            </p:txEl>
-                                          </p:spTgt>
-                                        </p:tgtEl>
-                                        <p:attrNameLst>
-                                          <p:attrName>style.visibility</p:attrName>
-                                        </p:attrNameLst>
-                                      </p:cBhvr>
-                                      <p:to>
-                                        <p:strVal val="visible"/>
-                                      </p:to>
-                                    </p:set>
-                                  </p:childTnLst>
-                                </p:cTn>
-                              </p:par>
-                            </p:childTnLst>
-                          </p:cTn>
-                        </p:par>
-                      </p:childTnLst>
-                    </p:cTn>
-                  </p:par>
-                  <p:par>
-                    <p:cTn id="29" fill="hold">
-                      <p:stCondLst>
-                        <p:cond delay="indefinite"/>
-                      </p:stCondLst>
-                      <p:childTnLst>
-                        <p:par>
-                          <p:cTn id="30" fill="hold">
-                            <p:stCondLst>
-                              <p:cond delay="0"/>
-                            </p:stCondLst>
-                            <p:childTnLst>
-                              <p:par>
-                                <p:cTn id="31" presetClass="entr" nodeType="clickEffect" presetSubtype="0" presetID="1" grpId="1" fill="hold">
-                                  <p:stCondLst>
-                                    <p:cond delay="0"/>
-                                  </p:stCondLst>
-                                  <p:iterate type="el" backwards="0">
-                                    <p:tmAbs val="0"/>
-                                  </p:iterate>
-                                  <p:childTnLst>
-                                    <p:set>
-                                      <p:cBhvr>
-                                        <p:cTn id="32" fill="hold"/>
-                                        <p:tgtEl>
-                                          <p:spTgt spid="345">
-                                            <p:txEl>
-                                              <p:pRg st="6" end="6"/>
-                                            </p:txEl>
-                                          </p:spTgt>
-                                        </p:tgtEl>
-                                        <p:attrNameLst>
-                                          <p:attrName>style.visibility</p:attrName>
-                                        </p:attrNameLst>
-                                      </p:cBhvr>
-                                      <p:to>
-                                        <p:strVal val="visible"/>
-                                      </p:to>
-                                    </p:set>
-                                  </p:childTnLst>
-                                </p:cTn>
-                              </p:par>
-                            </p:childTnLst>
-                          </p:cTn>
-                        </p:par>
-                      </p:childTnLst>
-                    </p:cTn>
-                  </p:par>
-                  <p:par>
-                    <p:cTn id="33" fill="hold">
-                      <p:stCondLst>
-                        <p:cond delay="indefinite"/>
-                      </p:stCondLst>
-                      <p:childTnLst>
-                        <p:par>
-                          <p:cTn id="34" fill="hold">
-                            <p:stCondLst>
-                              <p:cond delay="0"/>
-                            </p:stCondLst>
-                            <p:childTnLst>
-                              <p:par>
-                                <p:cTn id="35" presetClass="entr" nodeType="clickEffect" presetSubtype="0" presetID="1" grpId="1" fill="hold">
-                                  <p:stCondLst>
-                                    <p:cond delay="0"/>
-                                  </p:stCondLst>
-                                  <p:iterate type="el" backwards="0">
-                                    <p:tmAbs val="0"/>
-                                  </p:iterate>
-                                  <p:childTnLst>
-                                    <p:set>
-                                      <p:cBhvr>
-                                        <p:cTn id="36" fill="hold"/>
-                                        <p:tgtEl>
-                                          <p:spTgt spid="345">
-                                            <p:txEl>
-                                              <p:pRg st="7" end="7"/>
-                                            </p:txEl>
-                                          </p:spTgt>
-                                        </p:tgtEl>
-                                        <p:attrNameLst>
-                                          <p:attrName>style.visibility</p:attrName>
-                                        </p:attrNameLst>
-                                      </p:cBhvr>
-                                      <p:to>
-                                        <p:strVal val="visible"/>
-                                      </p:to>
-                                    </p:set>
-                                  </p:childTnLst>
-                                </p:cTn>
-                              </p:par>
-                            </p:childTnLst>
-                          </p:cTn>
-                        </p:par>
-                      </p:childTnLst>
-                    </p:cTn>
-                  </p:par>
-                  <p:par>
-                    <p:cTn id="37" fill="hold">
-                      <p:stCondLst>
-                        <p:cond delay="indefinite"/>
-                      </p:stCondLst>
-                      <p:childTnLst>
-                        <p:par>
-                          <p:cTn id="38" fill="hold">
-                            <p:stCondLst>
-                              <p:cond delay="0"/>
-                            </p:stCondLst>
-                            <p:childTnLst>
-                              <p:par>
-                                <p:cTn id="39" presetClass="entr" nodeType="clickEffect" presetSubtype="0" presetID="1" grpId="1" fill="hold">
-                                  <p:stCondLst>
-                                    <p:cond delay="0"/>
-                                  </p:stCondLst>
-                                  <p:iterate type="el" backwards="0">
-                                    <p:tmAbs val="0"/>
-                                  </p:iterate>
-                                  <p:childTnLst>
-                                    <p:set>
-                                      <p:cBhvr>
-                                        <p:cTn id="40" fill="hold"/>
-                                        <p:tgtEl>
-                                          <p:spTgt spid="345">
-                                            <p:txEl>
-                                              <p:pRg st="8" end="8"/>
-                                            </p:txEl>
-                                          </p:spTgt>
-                                        </p:tgtEl>
-                                        <p:attrNameLst>
-                                          <p:attrName>style.visibility</p:attrName>
-                                        </p:attrNameLst>
-                                      </p:cBhvr>
-                                      <p:to>
-                                        <p:strVal val="visible"/>
-                                      </p:to>
-                                    </p:set>
-                                  </p:childTnLst>
-                                </p:cTn>
-                              </p:par>
-                            </p:childTnLst>
-                          </p:cTn>
-                        </p:par>
-                      </p:childTnLst>
-                    </p:cTn>
-                  </p:par>
-                  <p:par>
-                    <p:cTn id="41" fill="hold">
-                      <p:stCondLst>
-                        <p:cond delay="indefinite"/>
-                      </p:stCondLst>
-                      <p:childTnLst>
-                        <p:par>
-                          <p:cTn id="42" fill="hold">
-                            <p:stCondLst>
-                              <p:cond delay="0"/>
-                            </p:stCondLst>
-                            <p:childTnLst>
-                              <p:par>
-                                <p:cTn id="43" presetClass="entr" nodeType="clickEffect" presetSubtype="0" presetID="1" grpId="1" fill="hold">
-                                  <p:stCondLst>
-                                    <p:cond delay="0"/>
-                                  </p:stCondLst>
-                                  <p:iterate type="el" backwards="0">
-                                    <p:tmAbs val="0"/>
-                                  </p:iterate>
-                                  <p:childTnLst>
-                                    <p:set>
-                                      <p:cBhvr>
-                                        <p:cTn id="44" fill="hold"/>
-                                        <p:tgtEl>
-                                          <p:spTgt spid="345">
-                                            <p:txEl>
-                                              <p:pRg st="9" end="9"/>
-                                            </p:txEl>
-                                          </p:spTgt>
-                                        </p:tgtEl>
-                                        <p:attrNameLst>
-                                          <p:attrName>style.visibility</p:attrName>
-                                        </p:attrNameLst>
-                                      </p:cBhvr>
-                                      <p:to>
-                                        <p:strVal val="visible"/>
-                                      </p:to>
-                                    </p:set>
-                                  </p:childTnLst>
-                                </p:cTn>
-                              </p:par>
-                            </p:childTnLst>
-                          </p:cTn>
-                        </p:par>
-                      </p:childTnLst>
-                    </p:cTn>
-                  </p:par>
-                  <p:par>
-                    <p:cTn id="45" fill="hold">
-                      <p:stCondLst>
-                        <p:cond delay="indefinite"/>
-                      </p:stCondLst>
-                      <p:childTnLst>
-                        <p:par>
-                          <p:cTn id="46" fill="hold">
-                            <p:stCondLst>
-                              <p:cond delay="0"/>
-                            </p:stCondLst>
-                            <p:childTnLst>
-                              <p:par>
-                                <p:cTn id="47" presetClass="entr" nodeType="clickEffect" presetSubtype="0" presetID="1" grpId="1" fill="hold">
-                                  <p:stCondLst>
-                                    <p:cond delay="0"/>
-                                  </p:stCondLst>
-                                  <p:iterate type="el" backwards="0">
-                                    <p:tmAbs val="0"/>
-                                  </p:iterate>
-                                  <p:childTnLst>
-                                    <p:set>
-                                      <p:cBhvr>
-                                        <p:cTn id="48" fill="hold"/>
-                                        <p:tgtEl>
-                                          <p:spTgt spid="345">
-                                            <p:txEl>
-                                              <p:pRg st="10" end="10"/>
-                                            </p:txEl>
-                                          </p:spTgt>
-                                        </p:tgtEl>
-                                        <p:attrNameLst>
-                                          <p:attrName>style.visibility</p:attrName>
-                                        </p:attrNameLst>
-                                      </p:cBhvr>
-                                      <p:to>
-                                        <p:strVal val="visible"/>
-                                      </p:to>
-                                    </p:set>
-                                  </p:childTnLst>
-                                </p:cTn>
-                              </p:par>
-                            </p:childTnLst>
-                          </p:cTn>
-                        </p:par>
-                      </p:childTnLst>
-                    </p:cTn>
-                  </p:par>
-                  <p:par>
-                    <p:cTn id="49" fill="hold">
-                      <p:stCondLst>
-                        <p:cond delay="indefinite"/>
-                      </p:stCondLst>
-                      <p:childTnLst>
-                        <p:par>
-                          <p:cTn id="50" fill="hold">
-                            <p:stCondLst>
-                              <p:cond delay="0"/>
-                            </p:stCondLst>
-                            <p:childTnLst>
-                              <p:par>
-                                <p:cTn id="51" presetClass="entr" nodeType="clickEffect" presetSubtype="0" presetID="1" grpId="1" fill="hold">
-                                  <p:stCondLst>
-                                    <p:cond delay="0"/>
-                                  </p:stCondLst>
-                                  <p:iterate type="el" backwards="0">
-                                    <p:tmAbs val="0"/>
-                                  </p:iterate>
-                                  <p:childTnLst>
-                                    <p:set>
-                                      <p:cBhvr>
-                                        <p:cTn id="52" fill="hold"/>
-                                        <p:tgtEl>
-                                          <p:spTgt spid="345">
-                                            <p:txEl>
-                                              <p:pRg st="11" end="11"/>
-                                            </p:txEl>
-                                          </p:spTgt>
-                                        </p:tgtEl>
-                                        <p:attrNameLst>
-                                          <p:attrName>style.visibility</p:attrName>
-                                        </p:attrNameLst>
-                                      </p:cBhvr>
-                                      <p:to>
-                                        <p:strVal val="visible"/>
-                                      </p:to>
-                                    </p:set>
-                                  </p:childTnLst>
-                                </p:cTn>
-                              </p:par>
-                            </p:childTnLst>
-                          </p:cTn>
-                        </p:par>
-                      </p:childTnLst>
-                    </p:cTn>
-                  </p:par>
                 </p:childTnLst>
               </p:cTn>
               <p:prevCondLst>
@@ -18368,458 +17678,6 @@
     </p:tnLst>
     <p:bldLst>
       <p:bldP build="p" bldLvl="5" animBg="1" rev="0" advAuto="0" spid="345" grpId="1"/>
-    </p:bldLst>
-  </p:timing>
-</p:sld>
-</file>
-
-<file path=ppt/slides/slide19.xml><?xml version="1.0" encoding="utf-8"?>
-<p:sld xmlns:a="http://schemas.openxmlformats.org/drawingml/2006/main" xmlns:r="http://schemas.openxmlformats.org/officeDocument/2006/relationships" xmlns:p="http://schemas.openxmlformats.org/presentationml/2006/main" xmlns:m="http://schemas.openxmlformats.org/officeDocument/2006/math" xmlns:a14="http://schemas.microsoft.com/office/drawing/2010/main" showMasterSp="1" showMasterPhAnim="1">
-  <p:cSld>
-    <p:spTree>
-      <p:nvGrpSpPr>
-        <p:cNvPr id="1" name=""/>
-        <p:cNvGrpSpPr/>
-        <p:nvPr/>
-      </p:nvGrpSpPr>
-      <p:grpSpPr>
-        <a:xfrm>
-          <a:off x="0" y="0"/>
-          <a:ext cx="0" cy="0"/>
-          <a:chOff x="0" y="0"/>
-          <a:chExt cx="0" cy="0"/>
-        </a:xfrm>
-      </p:grpSpPr>
-      <p:sp>
-        <p:nvSpPr>
-          <p:cNvPr id="350" name="Summary"/>
-          <p:cNvSpPr txBox="1"/>
-          <p:nvPr>
-            <p:ph type="title"/>
-          </p:nvPr>
-        </p:nvSpPr>
-        <p:spPr>
-          <a:prstGeom prst="rect">
-            <a:avLst/>
-          </a:prstGeom>
-        </p:spPr>
-        <p:txBody>
-          <a:bodyPr/>
-          <a:lstStyle/>
-          <a:p>
-            <a:pPr/>
-            <a:r>
-              <a:t>Summary</a:t>
-            </a:r>
-          </a:p>
-        </p:txBody>
-      </p:sp>
-      <p:sp>
-        <p:nvSpPr>
-          <p:cNvPr id="351" name="Huffman codes…"/>
-          <p:cNvSpPr txBox="1"/>
-          <p:nvPr>
-            <p:ph type="body" idx="1"/>
-          </p:nvPr>
-        </p:nvSpPr>
-        <p:spPr>
-          <a:prstGeom prst="rect">
-            <a:avLst/>
-          </a:prstGeom>
-        </p:spPr>
-        <p:txBody>
-          <a:bodyPr/>
-          <a:lstStyle/>
-          <a:p>
-            <a:pPr/>
-            <a:r>
-              <a:t>Huffman codes</a:t>
-            </a:r>
-          </a:p>
-          <a:p>
-            <a:pPr/>
-            <a:r>
-              <a:t>Huffman tree</a:t>
-            </a:r>
-          </a:p>
-          <a:p>
-            <a:pPr/>
-            <a:r>
-              <a:t>Algo</a:t>
-            </a:r>
-          </a:p>
-          <a:p>
-            <a:pPr/>
-            <a:r>
-              <a:t>Complexity analysis</a:t>
-            </a:r>
-          </a:p>
-        </p:txBody>
-      </p:sp>
-      <p:sp>
-        <p:nvSpPr>
-          <p:cNvPr id="352" name="Slide Number"/>
-          <p:cNvSpPr txBox="1"/>
-          <p:nvPr>
-            <p:ph type="sldNum" sz="quarter" idx="2"/>
-          </p:nvPr>
-        </p:nvSpPr>
-        <p:spPr>
-          <a:prstGeom prst="rect">
-            <a:avLst/>
-          </a:prstGeom>
-          <a:extLst>
-            <a:ext uri="{C572A759-6A51-4108-AA02-DFA0A04FC94B}">
-              <ma14:wrappingTextBoxFlag xmlns:ma14="http://schemas.microsoft.com/office/mac/drawingml/2011/main" val="1"/>
-            </a:ext>
-          </a:extLst>
-        </p:spPr>
-        <p:txBody>
-          <a:bodyPr/>
-          <a:lstStyle/>
-          <a:p>
-            <a:pPr/>
-            <a:fld id="{86CB4B4D-7CA3-9044-876B-883B54F8677D}" type="slidenum"/>
-          </a:p>
-        </p:txBody>
-      </p:sp>
-      <p:sp>
-        <p:nvSpPr>
-          <p:cNvPr id="353" name="DAA/Greedy Algorithms"/>
-          <p:cNvSpPr txBox="1"/>
-          <p:nvPr/>
-        </p:nvSpPr>
-        <p:spPr>
-          <a:xfrm>
-            <a:off x="423212" y="6963885"/>
-            <a:ext cx="3244911" cy="431552"/>
-          </a:xfrm>
-          <a:prstGeom prst="rect">
-            <a:avLst/>
-          </a:prstGeom>
-          <a:ln w="12700">
-            <a:miter lim="400000"/>
-          </a:ln>
-          <a:extLst>
-            <a:ext uri="{C572A759-6A51-4108-AA02-DFA0A04FC94B}">
-              <ma14:wrappingTextBoxFlag xmlns:ma14="http://schemas.microsoft.com/office/mac/drawingml/2011/main" val="1"/>
-            </a:ext>
-          </a:extLst>
-        </p:spPr>
-        <p:txBody>
-          <a:bodyPr wrap="none" lIns="50800" tIns="50800" rIns="50800" bIns="50800" anchor="ctr">
-            <a:spAutoFit/>
-          </a:bodyPr>
-          <a:lstStyle>
-            <a:lvl1pPr>
-              <a:defRPr sz="2400"/>
-            </a:lvl1pPr>
-          </a:lstStyle>
-          <a:p>
-            <a:pPr/>
-            <a:r>
-              <a:t>DAA/Greedy Algorithms</a:t>
-            </a:r>
-          </a:p>
-        </p:txBody>
-      </p:sp>
-      <p:sp>
-        <p:nvSpPr>
-          <p:cNvPr id="354" name="RPR/"/>
-          <p:cNvSpPr txBox="1"/>
-          <p:nvPr/>
-        </p:nvSpPr>
-        <p:spPr>
-          <a:xfrm>
-            <a:off x="7535212" y="6988206"/>
-            <a:ext cx="705605" cy="382910"/>
-          </a:xfrm>
-          <a:prstGeom prst="rect">
-            <a:avLst/>
-          </a:prstGeom>
-          <a:ln w="12700">
-            <a:miter lim="400000"/>
-          </a:ln>
-          <a:extLst>
-            <a:ext uri="{C572A759-6A51-4108-AA02-DFA0A04FC94B}">
-              <ma14:wrappingTextBoxFlag xmlns:ma14="http://schemas.microsoft.com/office/mac/drawingml/2011/main" val="1"/>
-            </a:ext>
-          </a:extLst>
-        </p:spPr>
-        <p:txBody>
-          <a:bodyPr wrap="none" lIns="50800" tIns="50800" rIns="50800" bIns="50800" anchor="ctr">
-            <a:spAutoFit/>
-          </a:bodyPr>
-          <a:lstStyle>
-            <a:lvl1pPr>
-              <a:defRPr sz="2000"/>
-            </a:lvl1pPr>
-          </a:lstStyle>
-          <a:p>
-            <a:pPr/>
-            <a:r>
-              <a:t>RPR/</a:t>
-            </a:r>
-          </a:p>
-        </p:txBody>
-      </p:sp>
-    </p:spTree>
-  </p:cSld>
-  <p:clrMapOvr>
-    <a:masterClrMapping/>
-  </p:clrMapOvr>
-  <p:transition xmlns:p14="http://schemas.microsoft.com/office/powerpoint/2010/main" spd="med" advClick="1"/>
-  <p:timing>
-    <p:tnLst>
-      <p:par>
-        <p:cTn id="1" nodeType="tmRoot" restart="never" dur="indefinite" fill="hold">
-          <p:childTnLst>
-            <p:seq concurrent="1" prevAc="none" nextAc="seek">
-              <p:cTn id="2" nodeType="mainSeq" dur="indefinite" fill="hold">
-                <p:childTnLst>
-                  <p:par>
-                    <p:cTn id="3" fill="hold">
-                      <p:stCondLst>
-                        <p:cond delay="indefinite"/>
-                      </p:stCondLst>
-                      <p:childTnLst>
-                        <p:par>
-                          <p:cTn id="4" fill="hold">
-                            <p:stCondLst>
-                              <p:cond delay="0"/>
-                            </p:stCondLst>
-                            <p:childTnLst>
-                              <p:par>
-                                <p:cTn id="5" presetClass="entr" nodeType="clickEffect" presetSubtype="0" presetID="1" grpId="1" fill="hold">
-                                  <p:stCondLst>
-                                    <p:cond delay="0"/>
-                                  </p:stCondLst>
-                                  <p:iterate type="el" backwards="0">
-                                    <p:tmAbs val="0"/>
-                                  </p:iterate>
-                                  <p:childTnLst>
-                                    <p:set>
-                                      <p:cBhvr>
-                                        <p:cTn id="6" fill="hold"/>
-                                        <p:tgtEl>
-                                          <p:spTgt spid="351">
-                                            <p:bg/>
-                                          </p:spTgt>
-                                        </p:tgtEl>
-                                        <p:attrNameLst>
-                                          <p:attrName>style.visibility</p:attrName>
-                                        </p:attrNameLst>
-                                      </p:cBhvr>
-                                      <p:to>
-                                        <p:strVal val="visible"/>
-                                      </p:to>
-                                    </p:set>
-                                  </p:childTnLst>
-                                </p:cTn>
-                              </p:par>
-                              <p:par>
-                                <p:cTn id="7" presetClass="entr" nodeType="withEffect" presetSubtype="0" presetID="1" grpId="1" fill="hold">
-                                  <p:stCondLst>
-                                    <p:cond delay="0"/>
-                                  </p:stCondLst>
-                                  <p:iterate type="el" backwards="0">
-                                    <p:tmAbs val="0"/>
-                                  </p:iterate>
-                                  <p:childTnLst>
-                                    <p:set>
-                                      <p:cBhvr>
-                                        <p:cTn id="8" fill="hold"/>
-                                        <p:tgtEl>
-                                          <p:spTgt spid="351">
-                                            <p:txEl>
-                                              <p:pRg st="0" end="0"/>
-                                            </p:txEl>
-                                          </p:spTgt>
-                                        </p:tgtEl>
-                                        <p:attrNameLst>
-                                          <p:attrName>style.visibility</p:attrName>
-                                        </p:attrNameLst>
-                                      </p:cBhvr>
-                                      <p:to>
-                                        <p:strVal val="visible"/>
-                                      </p:to>
-                                    </p:set>
-                                  </p:childTnLst>
-                                </p:cTn>
-                              </p:par>
-                            </p:childTnLst>
-                          </p:cTn>
-                        </p:par>
-                      </p:childTnLst>
-                    </p:cTn>
-                  </p:par>
-                  <p:par>
-                    <p:cTn id="9" fill="hold">
-                      <p:stCondLst>
-                        <p:cond delay="indefinite"/>
-                      </p:stCondLst>
-                      <p:childTnLst>
-                        <p:par>
-                          <p:cTn id="10" fill="hold">
-                            <p:stCondLst>
-                              <p:cond delay="0"/>
-                            </p:stCondLst>
-                            <p:childTnLst>
-                              <p:par>
-                                <p:cTn id="11" presetClass="entr" nodeType="clickEffect" presetSubtype="0" presetID="1" grpId="1" fill="hold">
-                                  <p:stCondLst>
-                                    <p:cond delay="0"/>
-                                  </p:stCondLst>
-                                  <p:iterate type="el" backwards="0">
-                                    <p:tmAbs val="0"/>
-                                  </p:iterate>
-                                  <p:childTnLst>
-                                    <p:set>
-                                      <p:cBhvr>
-                                        <p:cTn id="12" fill="hold"/>
-                                        <p:tgtEl>
-                                          <p:spTgt spid="351">
-                                            <p:txEl>
-                                              <p:pRg st="1" end="1"/>
-                                            </p:txEl>
-                                          </p:spTgt>
-                                        </p:tgtEl>
-                                        <p:attrNameLst>
-                                          <p:attrName>style.visibility</p:attrName>
-                                        </p:attrNameLst>
-                                      </p:cBhvr>
-                                      <p:to>
-                                        <p:strVal val="visible"/>
-                                      </p:to>
-                                    </p:set>
-                                  </p:childTnLst>
-                                </p:cTn>
-                              </p:par>
-                            </p:childTnLst>
-                          </p:cTn>
-                        </p:par>
-                      </p:childTnLst>
-                    </p:cTn>
-                  </p:par>
-                  <p:par>
-                    <p:cTn id="13" fill="hold">
-                      <p:stCondLst>
-                        <p:cond delay="indefinite"/>
-                      </p:stCondLst>
-                      <p:childTnLst>
-                        <p:par>
-                          <p:cTn id="14" fill="hold">
-                            <p:stCondLst>
-                              <p:cond delay="0"/>
-                            </p:stCondLst>
-                            <p:childTnLst>
-                              <p:par>
-                                <p:cTn id="15" presetClass="entr" nodeType="clickEffect" presetSubtype="0" presetID="1" grpId="1" fill="hold">
-                                  <p:stCondLst>
-                                    <p:cond delay="0"/>
-                                  </p:stCondLst>
-                                  <p:iterate type="el" backwards="0">
-                                    <p:tmAbs val="0"/>
-                                  </p:iterate>
-                                  <p:childTnLst>
-                                    <p:set>
-                                      <p:cBhvr>
-                                        <p:cTn id="16" fill="hold"/>
-                                        <p:tgtEl>
-                                          <p:spTgt spid="351">
-                                            <p:txEl>
-                                              <p:pRg st="2" end="2"/>
-                                            </p:txEl>
-                                          </p:spTgt>
-                                        </p:tgtEl>
-                                        <p:attrNameLst>
-                                          <p:attrName>style.visibility</p:attrName>
-                                        </p:attrNameLst>
-                                      </p:cBhvr>
-                                      <p:to>
-                                        <p:strVal val="visible"/>
-                                      </p:to>
-                                    </p:set>
-                                  </p:childTnLst>
-                                </p:cTn>
-                              </p:par>
-                            </p:childTnLst>
-                          </p:cTn>
-                        </p:par>
-                      </p:childTnLst>
-                    </p:cTn>
-                  </p:par>
-                  <p:par>
-                    <p:cTn id="17" fill="hold">
-                      <p:stCondLst>
-                        <p:cond delay="indefinite"/>
-                      </p:stCondLst>
-                      <p:childTnLst>
-                        <p:par>
-                          <p:cTn id="18" fill="hold">
-                            <p:stCondLst>
-                              <p:cond delay="0"/>
-                            </p:stCondLst>
-                            <p:childTnLst>
-                              <p:par>
-                                <p:cTn id="19" presetClass="entr" nodeType="clickEffect" presetSubtype="0" presetID="1" grpId="1" fill="hold">
-                                  <p:stCondLst>
-                                    <p:cond delay="0"/>
-                                  </p:stCondLst>
-                                  <p:iterate type="el" backwards="0">
-                                    <p:tmAbs val="0"/>
-                                  </p:iterate>
-                                  <p:childTnLst>
-                                    <p:set>
-                                      <p:cBhvr>
-                                        <p:cTn id="20" fill="hold"/>
-                                        <p:tgtEl>
-                                          <p:spTgt spid="351">
-                                            <p:txEl>
-                                              <p:pRg st="3" end="3"/>
-                                            </p:txEl>
-                                          </p:spTgt>
-                                        </p:tgtEl>
-                                        <p:attrNameLst>
-                                          <p:attrName>style.visibility</p:attrName>
-                                        </p:attrNameLst>
-                                      </p:cBhvr>
-                                      <p:to>
-                                        <p:strVal val="visible"/>
-                                      </p:to>
-                                    </p:set>
-                                  </p:childTnLst>
-                                </p:cTn>
-                              </p:par>
-                            </p:childTnLst>
-                          </p:cTn>
-                        </p:par>
-                      </p:childTnLst>
-                    </p:cTn>
-                  </p:par>
-                </p:childTnLst>
-              </p:cTn>
-              <p:prevCondLst>
-                <p:cond evt="onPrev">
-                  <p:tgtEl>
-                    <p:sldTgt/>
-                  </p:tgtEl>
-                </p:cond>
-              </p:prevCondLst>
-              <p:nextCondLst>
-                <p:cond evt="onNext">
-                  <p:tgtEl>
-                    <p:sldTgt/>
-                  </p:tgtEl>
-                </p:cond>
-              </p:nextCondLst>
-            </p:seq>
-          </p:childTnLst>
-        </p:cTn>
-      </p:par>
-    </p:tnLst>
-    <p:bldLst>
-      <p:bldP build="p" bldLvl="5" animBg="1" rev="0" advAuto="0" spid="351" grpId="1"/>
     </p:bldLst>
   </p:timing>
 </p:sld>
@@ -22464,8 +21322,8 @@
       </p:par>
     </p:tnLst>
     <p:bldLst>
+      <p:bldP build="p" bldLvl="5" animBg="1" rev="0" advAuto="0" spid="66" grpId="1"/>
       <p:bldP build="whole" bldLvl="1" animBg="1" rev="0" advAuto="0" spid="70" grpId="2"/>
-      <p:bldP build="p" bldLvl="5" animBg="1" rev="0" advAuto="0" spid="66" grpId="1"/>
     </p:bldLst>
   </p:timing>
 </p:sld>
@@ -26206,8 +25064,8 @@
       </p:par>
     </p:tnLst>
     <p:bldLst>
+      <p:bldP build="p" bldLvl="5" animBg="1" rev="0" advAuto="0" spid="85" grpId="1"/>
       <p:bldP build="whole" bldLvl="1" animBg="1" rev="0" advAuto="0" spid="112" grpId="2"/>
-      <p:bldP build="p" bldLvl="5" animBg="1" rev="0" advAuto="0" spid="85" grpId="1"/>
     </p:bldLst>
   </p:timing>
 </p:sld>

</xml_diff>